<commit_message>
:books:,More updates and updates
</commit_message>
<xml_diff>
--- a/Dr. E Nduati, Superviser/Submissions/ENC222-0149_2017_OKOMO_JACOB_OKELLO_V3.pptx
+++ b/Dr. E Nduati, Superviser/Submissions/ENC222-0149_2017_OKOMO_JACOB_OKELLO_V3.pptx
@@ -2937,7 +2937,7 @@
                 <a:ea typeface="Verdana" panose="020B0604030504040204" pitchFamily="34" charset="0"/>
                 <a:cs typeface="Verdana" panose="020B0604030504040204" pitchFamily="34" charset="0"/>
               </a:rPr>
-              <a:t>24-Sep-21</a:t>
+              <a:t>27-Sep-21</a:t>
             </a:fld>
             <a:endParaRPr lang="de-DE" sz="1000" dirty="0">
               <a:solidFill>
@@ -5027,7 +5027,7 @@
           <a:p>
             <a:fld id="{440D235E-7DEE-46BF-B2F8-FEE76BCCEBEE}" type="datetimeFigureOut">
               <a:rPr lang="en-US" smtClean="0"/>
-              <a:t>9/24/2021</a:t>
+              <a:t>9/27/2021</a:t>
             </a:fld>
             <a:endParaRPr lang="en-US"/>
           </a:p>
@@ -5225,7 +5225,7 @@
           <a:p>
             <a:fld id="{440D235E-7DEE-46BF-B2F8-FEE76BCCEBEE}" type="datetimeFigureOut">
               <a:rPr lang="en-US" smtClean="0"/>
-              <a:t>9/24/2021</a:t>
+              <a:t>9/27/2021</a:t>
             </a:fld>
             <a:endParaRPr lang="en-US"/>
           </a:p>
@@ -5500,7 +5500,7 @@
           <a:p>
             <a:fld id="{440D235E-7DEE-46BF-B2F8-FEE76BCCEBEE}" type="datetimeFigureOut">
               <a:rPr lang="en-US" smtClean="0"/>
-              <a:t>9/24/2021</a:t>
+              <a:t>9/27/2021</a:t>
             </a:fld>
             <a:endParaRPr lang="en-US"/>
           </a:p>
@@ -5932,7 +5932,7 @@
           <a:p>
             <a:fld id="{440D235E-7DEE-46BF-B2F8-FEE76BCCEBEE}" type="datetimeFigureOut">
               <a:rPr lang="en-US" smtClean="0"/>
-              <a:t>9/24/2021</a:t>
+              <a:t>9/27/2021</a:t>
             </a:fld>
             <a:endParaRPr lang="en-US"/>
           </a:p>
@@ -6344,7 +6344,7 @@
           <a:p>
             <a:fld id="{440D235E-7DEE-46BF-B2F8-FEE76BCCEBEE}" type="datetimeFigureOut">
               <a:rPr lang="en-US" smtClean="0"/>
-              <a:t>9/24/2021</a:t>
+              <a:t>9/27/2021</a:t>
             </a:fld>
             <a:endParaRPr lang="en-US"/>
           </a:p>
@@ -6485,7 +6485,7 @@
           <a:p>
             <a:fld id="{440D235E-7DEE-46BF-B2F8-FEE76BCCEBEE}" type="datetimeFigureOut">
               <a:rPr lang="en-US" smtClean="0"/>
-              <a:t>9/24/2021</a:t>
+              <a:t>9/27/2021</a:t>
             </a:fld>
             <a:endParaRPr lang="en-US"/>
           </a:p>
@@ -6598,7 +6598,7 @@
           <a:p>
             <a:fld id="{440D235E-7DEE-46BF-B2F8-FEE76BCCEBEE}" type="datetimeFigureOut">
               <a:rPr lang="en-US" smtClean="0"/>
-              <a:t>9/24/2021</a:t>
+              <a:t>9/27/2021</a:t>
             </a:fld>
             <a:endParaRPr lang="en-US"/>
           </a:p>
@@ -6909,7 +6909,7 @@
           <a:p>
             <a:fld id="{440D235E-7DEE-46BF-B2F8-FEE76BCCEBEE}" type="datetimeFigureOut">
               <a:rPr lang="en-US" smtClean="0"/>
-              <a:t>9/24/2021</a:t>
+              <a:t>9/27/2021</a:t>
             </a:fld>
             <a:endParaRPr lang="en-US"/>
           </a:p>
@@ -7197,7 +7197,7 @@
           <a:p>
             <a:fld id="{440D235E-7DEE-46BF-B2F8-FEE76BCCEBEE}" type="datetimeFigureOut">
               <a:rPr lang="en-US" smtClean="0"/>
-              <a:t>9/24/2021</a:t>
+              <a:t>9/27/2021</a:t>
             </a:fld>
             <a:endParaRPr lang="en-US"/>
           </a:p>
@@ -7395,7 +7395,7 @@
           <a:p>
             <a:fld id="{440D235E-7DEE-46BF-B2F8-FEE76BCCEBEE}" type="datetimeFigureOut">
               <a:rPr lang="en-US" smtClean="0"/>
-              <a:t>9/24/2021</a:t>
+              <a:t>9/27/2021</a:t>
             </a:fld>
             <a:endParaRPr lang="en-US"/>
           </a:p>
@@ -7603,7 +7603,7 @@
           <a:p>
             <a:fld id="{440D235E-7DEE-46BF-B2F8-FEE76BCCEBEE}" type="datetimeFigureOut">
               <a:rPr lang="en-US" smtClean="0"/>
-              <a:t>9/24/2021</a:t>
+              <a:t>9/27/2021</a:t>
             </a:fld>
             <a:endParaRPr lang="en-US"/>
           </a:p>
@@ -10345,7 +10345,7 @@
           <a:p>
             <a:fld id="{440D235E-7DEE-46BF-B2F8-FEE76BCCEBEE}" type="datetimeFigureOut">
               <a:rPr lang="en-US" smtClean="0"/>
-              <a:t>9/24/2021</a:t>
+              <a:t>9/27/2021</a:t>
             </a:fld>
             <a:endParaRPr lang="en-US"/>
           </a:p>
@@ -17124,7 +17124,7 @@
                 <a:ea typeface="Calibri" panose="020F0502020204030204" pitchFamily="34" charset="0"/>
                 <a:cs typeface="Times New Roman" panose="02020603050405020304" pitchFamily="18" charset="0"/>
               </a:rPr>
-              <a:t>Estimate Lake Surface Water Temp (LSWT) </a:t>
+              <a:t>Estimate Lake Surface Air Temp (LSAT) </a:t>
             </a:r>
           </a:p>
         </p:txBody>
@@ -18143,105 +18143,6 @@
       </p:cxnSp>
       <p:sp>
         <p:nvSpPr>
-          <p:cNvPr id="80" name="Flowchart: Predefined Process 79">
-            <a:extLst>
-              <a:ext uri="{FF2B5EF4-FFF2-40B4-BE49-F238E27FC236}">
-                <a16:creationId xmlns:a16="http://schemas.microsoft.com/office/drawing/2014/main" id="{E6B97B55-4F68-4472-B159-F38E16978B92}"/>
-              </a:ext>
-            </a:extLst>
-          </p:cNvPr>
-          <p:cNvSpPr/>
-          <p:nvPr/>
-        </p:nvSpPr>
-        <p:spPr>
-          <a:xfrm>
-            <a:off x="7215158" y="1054079"/>
-            <a:ext cx="1693690" cy="485891"/>
-          </a:xfrm>
-          <a:prstGeom prst="flowChartPredefinedProcess">
-            <a:avLst/>
-          </a:prstGeom>
-          <a:solidFill>
-            <a:schemeClr val="accent1">
-              <a:lumMod val="20000"/>
-              <a:lumOff val="80000"/>
-            </a:schemeClr>
-          </a:solidFill>
-        </p:spPr>
-        <p:style>
-          <a:lnRef idx="2">
-            <a:schemeClr val="accent6"/>
-          </a:lnRef>
-          <a:fillRef idx="1">
-            <a:schemeClr val="lt1"/>
-          </a:fillRef>
-          <a:effectRef idx="0">
-            <a:schemeClr val="accent6"/>
-          </a:effectRef>
-          <a:fontRef idx="minor">
-            <a:schemeClr val="dk1"/>
-          </a:fontRef>
-        </p:style>
-        <p:txBody>
-          <a:bodyPr rtlCol="0" anchor="ctr"/>
-          <a:lstStyle/>
-          <a:p>
-            <a:pPr algn="ctr"/>
-            <a:r>
-              <a:rPr lang="en-US" sz="1100" b="1" dirty="0">
-                <a:latin typeface="Verdana" panose="020B0604030504040204" pitchFamily="34" charset="0"/>
-                <a:ea typeface="Verdana" panose="020B0604030504040204" pitchFamily="34" charset="0"/>
-              </a:rPr>
-              <a:t>Geometric Corrections</a:t>
-            </a:r>
-          </a:p>
-        </p:txBody>
-      </p:sp>
-      <p:cxnSp>
-        <p:nvCxnSpPr>
-          <p:cNvPr id="87" name="Connector: Elbow 86">
-            <a:extLst>
-              <a:ext uri="{FF2B5EF4-FFF2-40B4-BE49-F238E27FC236}">
-                <a16:creationId xmlns:a16="http://schemas.microsoft.com/office/drawing/2014/main" id="{7FF90A85-13A2-49AB-8C51-BF37996F533C}"/>
-              </a:ext>
-            </a:extLst>
-          </p:cNvPr>
-          <p:cNvCxnSpPr>
-            <a:cxnSpLocks/>
-          </p:cNvCxnSpPr>
-          <p:nvPr/>
-        </p:nvCxnSpPr>
-        <p:spPr>
-          <a:xfrm>
-            <a:off x="4811254" y="2767039"/>
-            <a:ext cx="2478734" cy="1263451"/>
-          </a:xfrm>
-          <a:prstGeom prst="bentConnector3">
-            <a:avLst>
-              <a:gd name="adj1" fmla="val 50000"/>
-            </a:avLst>
-          </a:prstGeom>
-          <a:ln>
-            <a:tailEnd type="triangle"/>
-          </a:ln>
-        </p:spPr>
-        <p:style>
-          <a:lnRef idx="1">
-            <a:schemeClr val="accent1"/>
-          </a:lnRef>
-          <a:fillRef idx="0">
-            <a:schemeClr val="accent1"/>
-          </a:fillRef>
-          <a:effectRef idx="0">
-            <a:schemeClr val="accent1"/>
-          </a:effectRef>
-          <a:fontRef idx="minor">
-            <a:schemeClr val="tx1"/>
-          </a:fontRef>
-        </p:style>
-      </p:cxnSp>
-      <p:sp>
-        <p:nvSpPr>
           <p:cNvPr id="88" name="Rectangle 87">
             <a:extLst>
               <a:ext uri="{FF2B5EF4-FFF2-40B4-BE49-F238E27FC236}">
@@ -18401,7 +18302,7 @@
         </p:nvSpPr>
         <p:spPr>
           <a:xfrm>
-            <a:off x="7215158" y="296409"/>
+            <a:off x="7118339" y="464863"/>
             <a:ext cx="1693690" cy="485891"/>
           </a:xfrm>
           <a:prstGeom prst="flowChartPredefinedProcess">
@@ -18454,63 +18355,22 @@
           </p:cNvPr>
           <p:cNvCxnSpPr>
             <a:cxnSpLocks/>
-          </p:cNvCxnSpPr>
-          <p:nvPr/>
-        </p:nvCxnSpPr>
-        <p:spPr>
-          <a:xfrm rot="10800000">
-            <a:off x="6093242" y="1167451"/>
-            <a:ext cx="1121916" cy="129574"/>
-          </a:xfrm>
-          <a:prstGeom prst="bentConnector4">
-            <a:avLst>
-              <a:gd name="adj1" fmla="val 44515"/>
-              <a:gd name="adj2" fmla="val 236667"/>
-            </a:avLst>
-          </a:prstGeom>
-          <a:ln>
-            <a:tailEnd type="triangle"/>
-          </a:ln>
-        </p:spPr>
-        <p:style>
-          <a:lnRef idx="1">
-            <a:schemeClr val="accent1"/>
-          </a:lnRef>
-          <a:fillRef idx="0">
-            <a:schemeClr val="accent1"/>
-          </a:fillRef>
-          <a:effectRef idx="0">
-            <a:schemeClr val="accent1"/>
-          </a:effectRef>
-          <a:fontRef idx="minor">
-            <a:schemeClr val="tx1"/>
-          </a:fontRef>
-        </p:style>
-      </p:cxnSp>
-      <p:cxnSp>
-        <p:nvCxnSpPr>
-          <p:cNvPr id="104" name="Connector: Elbow 103">
-            <a:extLst>
-              <a:ext uri="{FF2B5EF4-FFF2-40B4-BE49-F238E27FC236}">
-                <a16:creationId xmlns:a16="http://schemas.microsoft.com/office/drawing/2014/main" id="{2E282FB1-B601-430F-87B6-7DA5B5D8B34C}"/>
-              </a:ext>
-            </a:extLst>
-          </p:cNvPr>
-          <p:cNvCxnSpPr>
-            <a:cxnSpLocks/>
+            <a:stCxn id="97" idx="1"/>
+            <a:endCxn id="54" idx="0"/>
           </p:cNvCxnSpPr>
           <p:nvPr/>
         </p:nvCxnSpPr>
         <p:spPr>
           <a:xfrm rot="10800000" flipV="1">
-            <a:off x="6654200" y="552694"/>
-            <a:ext cx="560958" cy="446301"/>
+            <a:off x="6093243" y="707809"/>
+            <a:ext cx="1025097" cy="459642"/>
           </a:xfrm>
-          <a:prstGeom prst="bentConnector3">
-            <a:avLst>
-              <a:gd name="adj1" fmla="val 89030"/>
-            </a:avLst>
+          <a:prstGeom prst="bentConnector2">
+            <a:avLst/>
           </a:prstGeom>
+          <a:ln>
+            <a:tailEnd type="triangle"/>
+          </a:ln>
         </p:spPr>
         <p:style>
           <a:lnRef idx="1">
@@ -18600,7 +18460,25 @@
                 <a:ea typeface="Calibri" panose="020F0502020204030204" pitchFamily="34" charset="0"/>
                 <a:cs typeface="Times New Roman" panose="02020603050405020304" pitchFamily="18" charset="0"/>
               </a:rPr>
-              <a:t>TOA DN to At-Sensor Radiance(Lλ)</a:t>
+              <a:t>TOA DN to At-Sensor Radiance(</a:t>
+            </a:r>
+            <a:r>
+              <a:rPr lang="en-US" sz="1000" b="1" i="1" dirty="0">
+                <a:effectLst/>
+                <a:latin typeface="Verdana" panose="020B0604030504040204" pitchFamily="34" charset="0"/>
+                <a:ea typeface="Calibri" panose="020F0502020204030204" pitchFamily="34" charset="0"/>
+                <a:cs typeface="Times New Roman" panose="02020603050405020304" pitchFamily="18" charset="0"/>
+              </a:rPr>
+              <a:t>Lλ</a:t>
+            </a:r>
+            <a:r>
+              <a:rPr lang="en-US" sz="1000" b="1" dirty="0">
+                <a:effectLst/>
+                <a:latin typeface="Verdana" panose="020B0604030504040204" pitchFamily="34" charset="0"/>
+                <a:ea typeface="Calibri" panose="020F0502020204030204" pitchFamily="34" charset="0"/>
+                <a:cs typeface="Times New Roman" panose="02020603050405020304" pitchFamily="18" charset="0"/>
+              </a:rPr>
+              <a:t>)</a:t>
             </a:r>
           </a:p>
         </p:txBody>
@@ -18619,8 +18497,8 @@
         </p:nvSpPr>
         <p:spPr>
           <a:xfrm>
-            <a:off x="7587578" y="4278995"/>
-            <a:ext cx="1424594" cy="436880"/>
+            <a:off x="7559602" y="4306410"/>
+            <a:ext cx="1321405" cy="393315"/>
           </a:xfrm>
           <a:prstGeom prst="flowChartDocument">
             <a:avLst/>
@@ -18658,7 +18536,7 @@
                 <a:latin typeface="Verdana" panose="020B0604030504040204" pitchFamily="34" charset="0"/>
                 <a:ea typeface="Verdana" panose="020B0604030504040204" pitchFamily="34" charset="0"/>
               </a:rPr>
-              <a:t>CDOM/In-situ</a:t>
+              <a:t>Validation</a:t>
             </a:r>
           </a:p>
         </p:txBody>
@@ -18832,7 +18710,7 @@
         </p:nvSpPr>
         <p:spPr>
           <a:xfrm>
-            <a:off x="6654200" y="2940384"/>
+            <a:off x="6610734" y="2939894"/>
             <a:ext cx="2094264" cy="598007"/>
           </a:xfrm>
           <a:prstGeom prst="flowChartPredefinedProcess">
@@ -18886,28 +18764,30 @@
             </a:pPr>
             <a:r>
               <a:rPr lang="en-US" sz="1050" b="1" dirty="0">
+                <a:latin typeface="Verdana" panose="020B0604030504040204" pitchFamily="34" charset="0"/>
+                <a:ea typeface="Calibri" panose="020F0502020204030204" pitchFamily="34" charset="0"/>
+                <a:cs typeface="Times New Roman" panose="02020603050405020304" pitchFamily="18" charset="0"/>
+              </a:rPr>
+              <a:t>Ocean Color </a:t>
+            </a:r>
+            <a:r>
+              <a:rPr lang="en-US" sz="1050" b="1" i="1" dirty="0">
                 <a:effectLst/>
                 <a:latin typeface="Verdana" panose="020B0604030504040204" pitchFamily="34" charset="0"/>
                 <a:ea typeface="Calibri" panose="020F0502020204030204" pitchFamily="34" charset="0"/>
                 <a:cs typeface="Times New Roman" panose="02020603050405020304" pitchFamily="18" charset="0"/>
               </a:rPr>
-              <a:t>Basic </a:t>
-            </a:r>
-            <a:r>
-              <a:rPr lang="en-US" sz="1050" b="1">
+              <a:t>Chl-a</a:t>
+            </a:r>
+            <a:r>
+              <a:rPr lang="en-US" sz="1050" b="1" dirty="0">
                 <a:effectLst/>
                 <a:latin typeface="Verdana" panose="020B0604030504040204" pitchFamily="34" charset="0"/>
                 <a:ea typeface="Calibri" panose="020F0502020204030204" pitchFamily="34" charset="0"/>
                 <a:cs typeface="Times New Roman" panose="02020603050405020304" pitchFamily="18" charset="0"/>
               </a:rPr>
-              <a:t>Chl-a algorithms</a:t>
-            </a:r>
-            <a:endParaRPr lang="en-US" sz="1050" b="1" dirty="0">
-              <a:effectLst/>
-              <a:latin typeface="Verdana" panose="020B0604030504040204" pitchFamily="34" charset="0"/>
-              <a:ea typeface="Calibri" panose="020F0502020204030204" pitchFamily="34" charset="0"/>
-              <a:cs typeface="Times New Roman" panose="02020603050405020304" pitchFamily="18" charset="0"/>
-            </a:endParaRPr>
+              <a:t> algorithms</a:t>
+            </a:r>
           </a:p>
         </p:txBody>
       </p:sp>
@@ -18929,8 +18809,8 @@
         </p:nvCxnSpPr>
         <p:spPr>
           <a:xfrm rot="16200000" flipH="1">
-            <a:off x="7090434" y="2329486"/>
-            <a:ext cx="497380" cy="724415"/>
+            <a:off x="7068946" y="2350974"/>
+            <a:ext cx="496890" cy="680949"/>
           </a:xfrm>
           <a:prstGeom prst="bentConnector3">
             <a:avLst/>
@@ -18970,7 +18850,7 @@
         </p:nvCxnSpPr>
         <p:spPr>
           <a:xfrm rot="5400000">
-            <a:off x="8024506" y="2121488"/>
+            <a:off x="7982068" y="2132691"/>
             <a:ext cx="234677" cy="896760"/>
           </a:xfrm>
           <a:prstGeom prst="bentConnector2">
@@ -19044,14 +18924,13 @@
           </p:cNvPr>
           <p:cNvCxnSpPr>
             <a:cxnSpLocks/>
-            <a:stCxn id="119" idx="1"/>
           </p:cNvCxnSpPr>
           <p:nvPr/>
         </p:nvCxnSpPr>
         <p:spPr>
-          <a:xfrm flipH="1" flipV="1">
-            <a:off x="7314911" y="4494226"/>
-            <a:ext cx="272667" cy="3209"/>
+          <a:xfrm flipH="1">
+            <a:off x="7289987" y="4462582"/>
+            <a:ext cx="272666" cy="18574"/>
           </a:xfrm>
           <a:prstGeom prst="straightConnector1">
             <a:avLst/>
@@ -19089,7 +18968,7 @@
         </p:nvSpPr>
         <p:spPr>
           <a:xfrm>
-            <a:off x="4934367" y="6308878"/>
+            <a:off x="3598171" y="6333003"/>
             <a:ext cx="1667666" cy="359386"/>
           </a:xfrm>
           <a:prstGeom prst="rect">
@@ -19147,49 +19026,6 @@
           </a:p>
         </p:txBody>
       </p:sp>
-      <p:cxnSp>
-        <p:nvCxnSpPr>
-          <p:cNvPr id="38" name="Connector: Elbow 37">
-            <a:extLst>
-              <a:ext uri="{FF2B5EF4-FFF2-40B4-BE49-F238E27FC236}">
-                <a16:creationId xmlns:a16="http://schemas.microsoft.com/office/drawing/2014/main" id="{09A68EB0-35E3-43A4-95D7-7AAEB133E69F}"/>
-              </a:ext>
-            </a:extLst>
-          </p:cNvPr>
-          <p:cNvCxnSpPr>
-            <a:cxnSpLocks/>
-            <a:stCxn id="64" idx="3"/>
-            <a:endCxn id="17" idx="2"/>
-          </p:cNvCxnSpPr>
-          <p:nvPr/>
-        </p:nvCxnSpPr>
-        <p:spPr>
-          <a:xfrm flipV="1">
-            <a:off x="6602033" y="5948682"/>
-            <a:ext cx="687955" cy="539889"/>
-          </a:xfrm>
-          <a:prstGeom prst="bentConnector2">
-            <a:avLst/>
-          </a:prstGeom>
-          <a:ln>
-            <a:tailEnd type="triangle"/>
-          </a:ln>
-        </p:spPr>
-        <p:style>
-          <a:lnRef idx="1">
-            <a:schemeClr val="accent1"/>
-          </a:lnRef>
-          <a:fillRef idx="0">
-            <a:schemeClr val="accent1"/>
-          </a:fillRef>
-          <a:effectRef idx="0">
-            <a:schemeClr val="accent1"/>
-          </a:effectRef>
-          <a:fontRef idx="minor">
-            <a:schemeClr val="tx1"/>
-          </a:fontRef>
-        </p:style>
-      </p:cxnSp>
       <p:sp>
         <p:nvSpPr>
           <p:cNvPr id="55" name="Rectangle 54">
@@ -19263,7 +19099,25 @@
                 <a:ea typeface="Calibri" panose="020F0502020204030204" pitchFamily="34" charset="0"/>
                 <a:cs typeface="Times New Roman" panose="02020603050405020304" pitchFamily="18" charset="0"/>
               </a:rPr>
-              <a:t>Proportional of Vegetation(Pv)</a:t>
+              <a:t>Proportional of Vegetation(</a:t>
+            </a:r>
+            <a:r>
+              <a:rPr lang="en-US" sz="1000" b="1" i="1" dirty="0">
+                <a:effectLst/>
+                <a:latin typeface="Verdana" panose="020B0604030504040204" pitchFamily="34" charset="0"/>
+                <a:ea typeface="Calibri" panose="020F0502020204030204" pitchFamily="34" charset="0"/>
+                <a:cs typeface="Times New Roman" panose="02020603050405020304" pitchFamily="18" charset="0"/>
+              </a:rPr>
+              <a:t>Pv</a:t>
+            </a:r>
+            <a:r>
+              <a:rPr lang="en-US" sz="1000" b="1" dirty="0">
+                <a:effectLst/>
+                <a:latin typeface="Verdana" panose="020B0604030504040204" pitchFamily="34" charset="0"/>
+                <a:ea typeface="Calibri" panose="020F0502020204030204" pitchFamily="34" charset="0"/>
+                <a:cs typeface="Times New Roman" panose="02020603050405020304" pitchFamily="18" charset="0"/>
+              </a:rPr>
+              <a:t>)</a:t>
             </a:r>
           </a:p>
         </p:txBody>
@@ -19706,6 +19560,48 @@
           </a:prstGeom>
           <a:ln>
             <a:prstDash val="dashDot"/>
+            <a:tailEnd type="triangle"/>
+          </a:ln>
+        </p:spPr>
+        <p:style>
+          <a:lnRef idx="1">
+            <a:schemeClr val="accent1"/>
+          </a:lnRef>
+          <a:fillRef idx="0">
+            <a:schemeClr val="accent1"/>
+          </a:fillRef>
+          <a:effectRef idx="0">
+            <a:schemeClr val="accent1"/>
+          </a:effectRef>
+          <a:fontRef idx="minor">
+            <a:schemeClr val="tx1"/>
+          </a:fontRef>
+        </p:style>
+      </p:cxnSp>
+      <p:cxnSp>
+        <p:nvCxnSpPr>
+          <p:cNvPr id="63" name="Connector: Elbow 62">
+            <a:extLst>
+              <a:ext uri="{FF2B5EF4-FFF2-40B4-BE49-F238E27FC236}">
+                <a16:creationId xmlns:a16="http://schemas.microsoft.com/office/drawing/2014/main" id="{7412E559-CB58-4AA0-97BA-8647F57056F6}"/>
+              </a:ext>
+            </a:extLst>
+          </p:cNvPr>
+          <p:cNvCxnSpPr>
+            <a:cxnSpLocks/>
+            <a:stCxn id="64" idx="3"/>
+          </p:cNvCxnSpPr>
+          <p:nvPr/>
+        </p:nvCxnSpPr>
+        <p:spPr>
+          <a:xfrm flipV="1">
+            <a:off x="5265837" y="5751182"/>
+            <a:ext cx="266447" cy="761514"/>
+          </a:xfrm>
+          <a:prstGeom prst="bentConnector2">
+            <a:avLst/>
+          </a:prstGeom>
+          <a:ln>
             <a:tailEnd type="triangle"/>
           </a:ln>
         </p:spPr>

</xml_diff>